<commit_message>
fix hyf ue4 intro slides erratas
</commit_message>
<xml_diff>
--- a/content/en/post/2019-01-13-hackyourfuture-first-game-development-workshop-report/hackyourfuture-introduction-to-unreal-engine-4-game-development-using-blueprint.pptx
+++ b/content/en/post/2019-01-13-hackyourfuture-first-game-development-workshop-report/hackyourfuture-introduction-to-unreal-engine-4-game-development-using-blueprint.pptx
@@ -19852,7 +19852,7 @@
                 <a:cs typeface="Roboto"/>
                 <a:sym typeface="Roboto"/>
               </a:rPr>
-              <a:t>: by exposing variables or functions from C++ you have more control over exposing members, so you can a formal “API” for your class and avoids creating overly large and hard to follow Blueprints</a:t>
+              <a:t>: by exposing variables or functions from C++ you have more control over exposing members, so you can expose a formal “API” for your class and avoids creating overly large and hard to follow Blueprints</a:t>
             </a:r>
             <a:endParaRPr b="0" i="0" sz="1300" u="none" cap="none" strike="noStrike">
               <a:solidFill>
@@ -19904,7 +19904,7 @@
                 <a:cs typeface="Roboto"/>
                 <a:sym typeface="Roboto"/>
               </a:rPr>
-              <a:t>: in addition to access to more engine functionality, functions and variables exposed in C++ can be accessed from all other systems</a:t>
+              <a:t>: in addition to access to more engine functionality, functions and variables exposed in C++, can be accessed from all other systems</a:t>
             </a:r>
             <a:endParaRPr b="0" i="0" sz="1300" u="none" cap="none" strike="noStrike">
               <a:solidFill>
@@ -21412,7 +21412,31 @@
                 <a:cs typeface="Roboto"/>
                 <a:sym typeface="Roboto"/>
               </a:rPr>
-              <a:t>As a result a rich games asset marketplace exists for UE4 filled with 2D assets, 3D models, textures, materials,  3D characters, weapons, environment assets, animations, particles and visual effects, and music and sfx assets</a:t>
+              <a:t>As a result</a:t>
+            </a:r>
+            <a:r>
+              <a:rPr lang="en-US" sz="1300">
+                <a:solidFill>
+                  <a:srgbClr val="FFFFFF"/>
+                </a:solidFill>
+                <a:latin typeface="Roboto"/>
+                <a:ea typeface="Roboto"/>
+                <a:cs typeface="Roboto"/>
+                <a:sym typeface="Roboto"/>
+              </a:rPr>
+              <a:t>,</a:t>
+            </a:r>
+            <a:r>
+              <a:rPr b="0" i="0" lang="en-US" sz="1300" u="none" cap="none" strike="noStrike">
+                <a:solidFill>
+                  <a:srgbClr val="FFFFFF"/>
+                </a:solidFill>
+                <a:latin typeface="Roboto"/>
+                <a:ea typeface="Roboto"/>
+                <a:cs typeface="Roboto"/>
+                <a:sym typeface="Roboto"/>
+              </a:rPr>
+              <a:t> a rich games asset marketplace exists for UE4 filled with 2D assets, 3D models, textures, materials,  3D characters, weapons, environment assets, animations, particles and visual effects, and music and sfx assets</a:t>
             </a:r>
             <a:endParaRPr b="0" i="0" sz="1300" u="none" cap="none" strike="noStrike">
               <a:solidFill>
@@ -22631,7 +22655,55 @@
                 <a:cs typeface="Roboto"/>
                 <a:sym typeface="Roboto"/>
               </a:rPr>
-              <a:t>Getting involved with active unreal engine 4 game development communities</a:t>
+              <a:t>Getting involved with active </a:t>
+            </a:r>
+            <a:r>
+              <a:rPr lang="en-US" sz="1300">
+                <a:solidFill>
+                  <a:srgbClr val="FFFFFF"/>
+                </a:solidFill>
+                <a:latin typeface="Roboto"/>
+                <a:ea typeface="Roboto"/>
+                <a:cs typeface="Roboto"/>
+                <a:sym typeface="Roboto"/>
+              </a:rPr>
+              <a:t>U</a:t>
+            </a:r>
+            <a:r>
+              <a:rPr b="0" i="0" lang="en-US" sz="1300" u="none" cap="none" strike="noStrike">
+                <a:solidFill>
+                  <a:srgbClr val="FFFFFF"/>
+                </a:solidFill>
+                <a:latin typeface="Roboto"/>
+                <a:ea typeface="Roboto"/>
+                <a:cs typeface="Roboto"/>
+                <a:sym typeface="Roboto"/>
+              </a:rPr>
+              <a:t>nreal </a:t>
+            </a:r>
+            <a:r>
+              <a:rPr lang="en-US" sz="1300">
+                <a:solidFill>
+                  <a:srgbClr val="FFFFFF"/>
+                </a:solidFill>
+                <a:latin typeface="Roboto"/>
+                <a:ea typeface="Roboto"/>
+                <a:cs typeface="Roboto"/>
+                <a:sym typeface="Roboto"/>
+              </a:rPr>
+              <a:t>E</a:t>
+            </a:r>
+            <a:r>
+              <a:rPr b="0" i="0" lang="en-US" sz="1300" u="none" cap="none" strike="noStrike">
+                <a:solidFill>
+                  <a:srgbClr val="FFFFFF"/>
+                </a:solidFill>
+                <a:latin typeface="Roboto"/>
+                <a:ea typeface="Roboto"/>
+                <a:cs typeface="Roboto"/>
+                <a:sym typeface="Roboto"/>
+              </a:rPr>
+              <a:t>ngine 4 game development communities</a:t>
             </a:r>
             <a:endParaRPr b="0" i="0" sz="1300" u="none" cap="none" strike="noStrike">
               <a:solidFill>
@@ -24781,7 +24853,55 @@
                 <a:cs typeface="Roboto"/>
                 <a:sym typeface="Roboto"/>
               </a:rPr>
-              <a:t>Getting involved with active unreal engine 4 game development communities</a:t>
+              <a:t>Getting involved with active </a:t>
+            </a:r>
+            <a:r>
+              <a:rPr b="1" lang="en-US" sz="2400">
+                <a:solidFill>
+                  <a:srgbClr val="FFFFFF"/>
+                </a:solidFill>
+                <a:latin typeface="Roboto"/>
+                <a:ea typeface="Roboto"/>
+                <a:cs typeface="Roboto"/>
+                <a:sym typeface="Roboto"/>
+              </a:rPr>
+              <a:t>U</a:t>
+            </a:r>
+            <a:r>
+              <a:rPr b="1" i="0" lang="en-US" sz="2400" u="none" cap="none" strike="noStrike">
+                <a:solidFill>
+                  <a:srgbClr val="FFFFFF"/>
+                </a:solidFill>
+                <a:latin typeface="Roboto"/>
+                <a:ea typeface="Roboto"/>
+                <a:cs typeface="Roboto"/>
+                <a:sym typeface="Roboto"/>
+              </a:rPr>
+              <a:t>nreal </a:t>
+            </a:r>
+            <a:r>
+              <a:rPr b="1" lang="en-US" sz="2400">
+                <a:solidFill>
+                  <a:srgbClr val="FFFFFF"/>
+                </a:solidFill>
+                <a:latin typeface="Roboto"/>
+                <a:ea typeface="Roboto"/>
+                <a:cs typeface="Roboto"/>
+                <a:sym typeface="Roboto"/>
+              </a:rPr>
+              <a:t>E</a:t>
+            </a:r>
+            <a:r>
+              <a:rPr b="1" i="0" lang="en-US" sz="2400" u="none" cap="none" strike="noStrike">
+                <a:solidFill>
+                  <a:srgbClr val="FFFFFF"/>
+                </a:solidFill>
+                <a:latin typeface="Roboto"/>
+                <a:ea typeface="Roboto"/>
+                <a:cs typeface="Roboto"/>
+                <a:sym typeface="Roboto"/>
+              </a:rPr>
+              <a:t>ngine 4 game development communities</a:t>
             </a:r>
             <a:br>
               <a:rPr b="0" i="0" lang="en-US" sz="1800" u="none" cap="none" strike="noStrike"/>
@@ -27902,7 +28022,31 @@
                 <a:cs typeface="Roboto"/>
                 <a:sym typeface="Roboto"/>
               </a:rPr>
-              <a:t>Please note that Xbox One, PlayStation 4 and NIntendo Switch are only available to dev teams who obtain a valid DevKit from their respective companies</a:t>
+              <a:t>Please note that Xbox One, PlayStation 4 and N</a:t>
+            </a:r>
+            <a:r>
+              <a:rPr lang="en-US" sz="1300">
+                <a:solidFill>
+                  <a:srgbClr val="FFFFFF"/>
+                </a:solidFill>
+                <a:latin typeface="Roboto"/>
+                <a:ea typeface="Roboto"/>
+                <a:cs typeface="Roboto"/>
+                <a:sym typeface="Roboto"/>
+              </a:rPr>
+              <a:t>i</a:t>
+            </a:r>
+            <a:r>
+              <a:rPr b="0" i="0" lang="en-US" sz="1300" u="none" cap="none" strike="noStrike">
+                <a:solidFill>
+                  <a:srgbClr val="FFFFFF"/>
+                </a:solidFill>
+                <a:latin typeface="Roboto"/>
+                <a:ea typeface="Roboto"/>
+                <a:cs typeface="Roboto"/>
+                <a:sym typeface="Roboto"/>
+              </a:rPr>
+              <a:t>ntendo Switch are only available to dev teams who obtain a valid DevKit from their respective companies</a:t>
             </a:r>
             <a:endParaRPr b="0" i="0" sz="1300" u="none" cap="none" strike="noStrike">
               <a:solidFill>
@@ -28334,9 +28478,9 @@
 </file>
 
 <file path=ppt/theme/theme1.xml><?xml version="1.0" encoding="utf-8"?>
-<a:theme xmlns:a="http://schemas.openxmlformats.org/drawingml/2006/main" xmlns:r="http://schemas.openxmlformats.org/officeDocument/2006/relationships" name="Office Theme">
+<a:theme xmlns:a="http://schemas.openxmlformats.org/drawingml/2006/main" xmlns:r="http://schemas.openxmlformats.org/officeDocument/2006/relationships">
   <a:themeElements>
-    <a:clrScheme name="Office">
+    <a:clrScheme name="Default">
       <a:dk1>
         <a:srgbClr val="000000"/>
       </a:dk1>
@@ -28344,34 +28488,34 @@
         <a:srgbClr val="FFFFFF"/>
       </a:lt1>
       <a:dk2>
-        <a:srgbClr val="1F497D"/>
+        <a:srgbClr val="158158"/>
       </a:dk2>
       <a:lt2>
-        <a:srgbClr val="EEECE1"/>
+        <a:srgbClr val="F3F3F3"/>
       </a:lt2>
       <a:accent1>
-        <a:srgbClr val="4F81BD"/>
+        <a:srgbClr val="058DC7"/>
       </a:accent1>
       <a:accent2>
-        <a:srgbClr val="C0504D"/>
+        <a:srgbClr val="50B432"/>
       </a:accent2>
       <a:accent3>
-        <a:srgbClr val="9BBB59"/>
+        <a:srgbClr val="ED561B"/>
       </a:accent3>
       <a:accent4>
-        <a:srgbClr val="8064A2"/>
+        <a:srgbClr val="EDEF00"/>
       </a:accent4>
       <a:accent5>
-        <a:srgbClr val="4BACC6"/>
+        <a:srgbClr val="24CBE5"/>
       </a:accent5>
       <a:accent6>
-        <a:srgbClr val="F79646"/>
+        <a:srgbClr val="64E572"/>
       </a:accent6>
       <a:hlink>
-        <a:srgbClr val="0000FF"/>
+        <a:srgbClr val="2200CC"/>
       </a:hlink>
       <a:folHlink>
-        <a:srgbClr val="800080"/>
+        <a:srgbClr val="551A8B"/>
       </a:folHlink>
     </a:clrScheme>
     <a:fontScheme name="Office">
@@ -28613,9 +28757,9 @@
 </file>
 
 <file path=ppt/theme/theme2.xml><?xml version="1.0" encoding="utf-8"?>
-<a:theme xmlns:a="http://schemas.openxmlformats.org/drawingml/2006/main" xmlns:r="http://schemas.openxmlformats.org/officeDocument/2006/relationships">
+<a:theme xmlns:a="http://schemas.openxmlformats.org/drawingml/2006/main" xmlns:r="http://schemas.openxmlformats.org/officeDocument/2006/relationships" name="Office Theme">
   <a:themeElements>
-    <a:clrScheme name="Default">
+    <a:clrScheme name="Office">
       <a:dk1>
         <a:srgbClr val="000000"/>
       </a:dk1>
@@ -28623,34 +28767,34 @@
         <a:srgbClr val="FFFFFF"/>
       </a:lt1>
       <a:dk2>
-        <a:srgbClr val="158158"/>
+        <a:srgbClr val="1F497D"/>
       </a:dk2>
       <a:lt2>
-        <a:srgbClr val="F3F3F3"/>
+        <a:srgbClr val="EEECE1"/>
       </a:lt2>
       <a:accent1>
-        <a:srgbClr val="058DC7"/>
+        <a:srgbClr val="4F81BD"/>
       </a:accent1>
       <a:accent2>
-        <a:srgbClr val="50B432"/>
+        <a:srgbClr val="C0504D"/>
       </a:accent2>
       <a:accent3>
-        <a:srgbClr val="ED561B"/>
+        <a:srgbClr val="9BBB59"/>
       </a:accent3>
       <a:accent4>
-        <a:srgbClr val="EDEF00"/>
+        <a:srgbClr val="8064A2"/>
       </a:accent4>
       <a:accent5>
-        <a:srgbClr val="24CBE5"/>
+        <a:srgbClr val="4BACC6"/>
       </a:accent5>
       <a:accent6>
-        <a:srgbClr val="64E572"/>
+        <a:srgbClr val="F79646"/>
       </a:accent6>
       <a:hlink>
-        <a:srgbClr val="2200CC"/>
+        <a:srgbClr val="0000FF"/>
       </a:hlink>
       <a:folHlink>
-        <a:srgbClr val="551A8B"/>
+        <a:srgbClr val="800080"/>
       </a:folHlink>
     </a:clrScheme>
     <a:fontScheme name="Office">

</xml_diff>

<commit_message>
update ue hyf slides
</commit_message>
<xml_diff>
--- a/content/en/post/2019-01-13-hackyourfuture-first-game-development-workshop-report/hackyourfuture-introduction-to-unreal-engine-4-game-development-using-blueprint.pptx
+++ b/content/en/post/2019-01-13-hackyourfuture-first-game-development-workshop-report/hackyourfuture-introduction-to-unreal-engine-4-game-development-using-blueprint.pptx
@@ -24551,12 +24551,64 @@
             </a:r>
             <a:endParaRPr b="0" i="0" sz="1300" u="none" cap="none" strike="noStrike">
               <a:solidFill>
-                <a:srgbClr val="000000"/>
+                <a:srgbClr val="FFFFFF"/>
               </a:solidFill>
-              <a:latin typeface="Arial"/>
-              <a:ea typeface="Arial"/>
-              <a:cs typeface="Arial"/>
-              <a:sym typeface="Arial"/>
+              <a:latin typeface="Roboto"/>
+              <a:ea typeface="Roboto"/>
+              <a:cs typeface="Roboto"/>
+              <a:sym typeface="Roboto"/>
+            </a:endParaRPr>
+          </a:p>
+          <a:p>
+            <a:pPr indent="-310680" lvl="0" marL="457200" marR="0" rtl="0" algn="l">
+              <a:lnSpc>
+                <a:spcPct val="115000"/>
+              </a:lnSpc>
+              <a:spcBef>
+                <a:spcPts val="0"/>
+              </a:spcBef>
+              <a:spcAft>
+                <a:spcPts val="0"/>
+              </a:spcAft>
+              <a:buClr>
+                <a:srgbClr val="FFFFFF"/>
+              </a:buClr>
+              <a:buSzPts val="1300"/>
+              <a:buFont typeface="Roboto"/>
+              <a:buChar char="●"/>
+            </a:pPr>
+            <a:r>
+              <a:rPr b="1" lang="en-US" sz="1300">
+                <a:solidFill>
+                  <a:srgbClr val="FFFFFF"/>
+                </a:solidFill>
+                <a:latin typeface="Roboto"/>
+                <a:ea typeface="Roboto"/>
+                <a:cs typeface="Roboto"/>
+                <a:sym typeface="Roboto"/>
+              </a:rPr>
+              <a:t>The Cherno</a:t>
+            </a:r>
+            <a:r>
+              <a:rPr lang="en-US" sz="1300">
+                <a:solidFill>
+                  <a:srgbClr val="FFFFFF"/>
+                </a:solidFill>
+                <a:latin typeface="Roboto"/>
+                <a:ea typeface="Roboto"/>
+                <a:cs typeface="Roboto"/>
+                <a:sym typeface="Roboto"/>
+              </a:rPr>
+              <a:t> C++, OpenGL, Game Development, etc tuturials - https://www.youtube.com/user/TheChernoProject/playlists</a:t>
+            </a:r>
+            <a:endParaRPr sz="1300">
+              <a:solidFill>
+                <a:srgbClr val="FFFFFF"/>
+              </a:solidFill>
+              <a:latin typeface="Roboto"/>
+              <a:ea typeface="Roboto"/>
+              <a:cs typeface="Roboto"/>
+              <a:sym typeface="Roboto"/>
             </a:endParaRPr>
           </a:p>
           <a:p>
@@ -28478,9 +28530,9 @@
 </file>
 
 <file path=ppt/theme/theme1.xml><?xml version="1.0" encoding="utf-8"?>
-<a:theme xmlns:a="http://schemas.openxmlformats.org/drawingml/2006/main" xmlns:r="http://schemas.openxmlformats.org/officeDocument/2006/relationships">
+<a:theme xmlns:a="http://schemas.openxmlformats.org/drawingml/2006/main" xmlns:r="http://schemas.openxmlformats.org/officeDocument/2006/relationships" name="Office Theme">
   <a:themeElements>
-    <a:clrScheme name="Default">
+    <a:clrScheme name="Office">
       <a:dk1>
         <a:srgbClr val="000000"/>
       </a:dk1>
@@ -28488,34 +28540,34 @@
         <a:srgbClr val="FFFFFF"/>
       </a:lt1>
       <a:dk2>
-        <a:srgbClr val="158158"/>
+        <a:srgbClr val="1F497D"/>
       </a:dk2>
       <a:lt2>
-        <a:srgbClr val="F3F3F3"/>
+        <a:srgbClr val="EEECE1"/>
       </a:lt2>
       <a:accent1>
-        <a:srgbClr val="058DC7"/>
+        <a:srgbClr val="4F81BD"/>
       </a:accent1>
       <a:accent2>
-        <a:srgbClr val="50B432"/>
+        <a:srgbClr val="C0504D"/>
       </a:accent2>
       <a:accent3>
-        <a:srgbClr val="ED561B"/>
+        <a:srgbClr val="9BBB59"/>
       </a:accent3>
       <a:accent4>
-        <a:srgbClr val="EDEF00"/>
+        <a:srgbClr val="8064A2"/>
       </a:accent4>
       <a:accent5>
-        <a:srgbClr val="24CBE5"/>
+        <a:srgbClr val="4BACC6"/>
       </a:accent5>
       <a:accent6>
-        <a:srgbClr val="64E572"/>
+        <a:srgbClr val="F79646"/>
       </a:accent6>
       <a:hlink>
-        <a:srgbClr val="2200CC"/>
+        <a:srgbClr val="0000FF"/>
       </a:hlink>
       <a:folHlink>
-        <a:srgbClr val="551A8B"/>
+        <a:srgbClr val="800080"/>
       </a:folHlink>
     </a:clrScheme>
     <a:fontScheme name="Office">
@@ -29036,9 +29088,9 @@
 </file>
 
 <file path=ppt/theme/theme3.xml><?xml version="1.0" encoding="utf-8"?>
-<a:theme xmlns:a="http://schemas.openxmlformats.org/drawingml/2006/main" xmlns:r="http://schemas.openxmlformats.org/officeDocument/2006/relationships" name="Office Theme">
+<a:theme xmlns:a="http://schemas.openxmlformats.org/drawingml/2006/main" xmlns:r="http://schemas.openxmlformats.org/officeDocument/2006/relationships">
   <a:themeElements>
-    <a:clrScheme name="Office">
+    <a:clrScheme name="Default">
       <a:dk1>
         <a:srgbClr val="000000"/>
       </a:dk1>
@@ -29046,34 +29098,34 @@
         <a:srgbClr val="FFFFFF"/>
       </a:lt1>
       <a:dk2>
-        <a:srgbClr val="1F497D"/>
+        <a:srgbClr val="158158"/>
       </a:dk2>
       <a:lt2>
-        <a:srgbClr val="EEECE1"/>
+        <a:srgbClr val="F3F3F3"/>
       </a:lt2>
       <a:accent1>
-        <a:srgbClr val="4F81BD"/>
+        <a:srgbClr val="058DC7"/>
       </a:accent1>
       <a:accent2>
-        <a:srgbClr val="C0504D"/>
+        <a:srgbClr val="50B432"/>
       </a:accent2>
       <a:accent3>
-        <a:srgbClr val="9BBB59"/>
+        <a:srgbClr val="ED561B"/>
       </a:accent3>
       <a:accent4>
-        <a:srgbClr val="8064A2"/>
+        <a:srgbClr val="EDEF00"/>
       </a:accent4>
       <a:accent5>
-        <a:srgbClr val="4BACC6"/>
+        <a:srgbClr val="24CBE5"/>
       </a:accent5>
       <a:accent6>
-        <a:srgbClr val="F79646"/>
+        <a:srgbClr val="64E572"/>
       </a:accent6>
       <a:hlink>
-        <a:srgbClr val="0000FF"/>
+        <a:srgbClr val="2200CC"/>
       </a:hlink>
       <a:folHlink>
-        <a:srgbClr val="800080"/>
+        <a:srgbClr val="551A8B"/>
       </a:folHlink>
     </a:clrScheme>
     <a:fontScheme name="Office">

</xml_diff>